<commit_message>
Alternative slides for second lecture: better structured, namespaces added
git-svn-id: https://svn.code.sf.net/p/cpp-lects-rus/code/trunk@222 39143b06-f351-456c-9f92-4cd32fad6823
</commit_message>
<xml_diff>
--- a/slides/sep2017/01-strings.pptx
+++ b/slides/sep2017/01-strings.pptx
@@ -262,7 +262,7 @@
           <a:p>
             <a:fld id="{D0F53610-742D-41DE-86D1-B4A263AA8643}" type="datetimeFigureOut">
               <a:rPr lang="en-US" smtClean="0"/>
-              <a:t>9/3/2017</a:t>
+              <a:t>9/6/2017</a:t>
             </a:fld>
             <a:endParaRPr lang="en-US"/>
           </a:p>
@@ -811,7 +811,7 @@
             <a:fld id="{96DFF08F-DC6B-4601-B491-B0F83F6DD2DA}" type="datetimeFigureOut">
               <a:rPr lang="en-US" dirty="0"/>
               <a:pPr/>
-              <a:t>9/3/2017</a:t>
+              <a:t>9/6/2017</a:t>
             </a:fld>
             <a:endParaRPr lang="en-US" dirty="0"/>
           </a:p>
@@ -1028,7 +1028,7 @@
           <a:p>
             <a:fld id="{96DFF08F-DC6B-4601-B491-B0F83F6DD2DA}" type="datetimeFigureOut">
               <a:rPr lang="en-US" dirty="0"/>
-              <a:t>9/3/2017</a:t>
+              <a:t>9/6/2017</a:t>
             </a:fld>
             <a:endParaRPr lang="en-US" dirty="0"/>
           </a:p>
@@ -1203,7 +1203,7 @@
           <a:p>
             <a:fld id="{96DFF08F-DC6B-4601-B491-B0F83F6DD2DA}" type="datetimeFigureOut">
               <a:rPr lang="en-US" dirty="0"/>
-              <a:t>9/3/2017</a:t>
+              <a:t>9/6/2017</a:t>
             </a:fld>
             <a:endParaRPr lang="en-US" dirty="0"/>
           </a:p>
@@ -1368,7 +1368,7 @@
           <a:p>
             <a:fld id="{96DFF08F-DC6B-4601-B491-B0F83F6DD2DA}" type="datetimeFigureOut">
               <a:rPr lang="en-US" dirty="0"/>
-              <a:t>9/3/2017</a:t>
+              <a:t>9/6/2017</a:t>
             </a:fld>
             <a:endParaRPr lang="en-US" dirty="0"/>
           </a:p>
@@ -1614,7 +1614,7 @@
           <a:p>
             <a:fld id="{96DFF08F-DC6B-4601-B491-B0F83F6DD2DA}" type="datetimeFigureOut">
               <a:rPr lang="en-US" dirty="0"/>
-              <a:t>9/3/2017</a:t>
+              <a:t>9/6/2017</a:t>
             </a:fld>
             <a:endParaRPr lang="en-US" dirty="0"/>
           </a:p>
@@ -1932,7 +1932,7 @@
           <a:p>
             <a:fld id="{96DFF08F-DC6B-4601-B491-B0F83F6DD2DA}" type="datetimeFigureOut">
               <a:rPr lang="en-US" dirty="0"/>
-              <a:t>9/3/2017</a:t>
+              <a:t>9/6/2017</a:t>
             </a:fld>
             <a:endParaRPr lang="en-US" dirty="0"/>
           </a:p>
@@ -2351,7 +2351,7 @@
           <a:p>
             <a:fld id="{96DFF08F-DC6B-4601-B491-B0F83F6DD2DA}" type="datetimeFigureOut">
               <a:rPr lang="en-US" dirty="0"/>
-              <a:t>9/3/2017</a:t>
+              <a:t>9/6/2017</a:t>
             </a:fld>
             <a:endParaRPr lang="en-US" dirty="0"/>
           </a:p>
@@ -2464,7 +2464,7 @@
           <a:p>
             <a:fld id="{96DFF08F-DC6B-4601-B491-B0F83F6DD2DA}" type="datetimeFigureOut">
               <a:rPr lang="en-US" dirty="0"/>
-              <a:t>9/3/2017</a:t>
+              <a:t>9/6/2017</a:t>
             </a:fld>
             <a:endParaRPr lang="en-US" dirty="0"/>
           </a:p>
@@ -2554,7 +2554,7 @@
           <a:p>
             <a:fld id="{96DFF08F-DC6B-4601-B491-B0F83F6DD2DA}" type="datetimeFigureOut">
               <a:rPr lang="en-US" dirty="0"/>
-              <a:t>9/3/2017</a:t>
+              <a:t>9/6/2017</a:t>
             </a:fld>
             <a:endParaRPr lang="en-US" dirty="0"/>
           </a:p>
@@ -2839,7 +2839,7 @@
           <a:p>
             <a:fld id="{96DFF08F-DC6B-4601-B491-B0F83F6DD2DA}" type="datetimeFigureOut">
               <a:rPr lang="en-US" dirty="0"/>
-              <a:t>9/3/2017</a:t>
+              <a:t>9/6/2017</a:t>
             </a:fld>
             <a:endParaRPr lang="en-US" dirty="0"/>
           </a:p>
@@ -3106,7 +3106,7 @@
           <a:p>
             <a:fld id="{96DFF08F-DC6B-4601-B491-B0F83F6DD2DA}" type="datetimeFigureOut">
               <a:rPr lang="en-US" dirty="0"/>
-              <a:t>9/3/2017</a:t>
+              <a:t>9/6/2017</a:t>
             </a:fld>
             <a:endParaRPr lang="en-US" dirty="0"/>
           </a:p>
@@ -3355,7 +3355,7 @@
             <a:fld id="{96DFF08F-DC6B-4601-B491-B0F83F6DD2DA}" type="datetimeFigureOut">
               <a:rPr lang="en-US" dirty="0"/>
               <a:pPr/>
-              <a:t>9/3/2017</a:t>
+              <a:t>9/6/2017</a:t>
             </a:fld>
             <a:endParaRPr lang="en-US" dirty="0"/>
           </a:p>
@@ -4138,6 +4138,13 @@
   <p:clrMapOvr>
     <a:masterClrMapping/>
   </p:clrMapOvr>
+  <p:timing>
+    <p:tnLst>
+      <p:par>
+        <p:cTn id="1" dur="indefinite" restart="never" nodeType="tmRoot"/>
+      </p:par>
+    </p:tnLst>
+  </p:timing>
 </p:sld>
 </file>
 
@@ -5760,6 +5767,13 @@
   <p:clrMapOvr>
     <a:masterClrMapping/>
   </p:clrMapOvr>
+  <p:timing>
+    <p:tnLst>
+      <p:par>
+        <p:cTn id="1" dur="indefinite" restart="never" nodeType="tmRoot"/>
+      </p:par>
+    </p:tnLst>
+  </p:timing>
 </p:sld>
 </file>
 
@@ -6286,11 +6300,7 @@
           <a:p>
             <a:r>
               <a:rPr lang="ru-RU" smtClean="0"/>
-              <a:t>Работает </a:t>
-            </a:r>
-            <a:r>
-              <a:rPr lang="ru-RU" smtClean="0"/>
-              <a:t>ли этот вариант?</a:t>
+              <a:t>Работает ли этот вариант?</a:t>
             </a:r>
             <a:endParaRPr lang="en-US"/>
           </a:p>
@@ -6388,13 +6398,7 @@
               <a:rPr lang="en-US" smtClean="0">
                 <a:latin typeface="Consolas" panose="020B0609020204030204" pitchFamily="49" charset="0"/>
               </a:rPr>
-              <a:t>char* strncpy </a:t>
-            </a:r>
-            <a:r>
-              <a:rPr lang="en-US" smtClean="0">
-                <a:latin typeface="Consolas" panose="020B0609020204030204" pitchFamily="49" charset="0"/>
-              </a:rPr>
-              <a:t>(char *dst, const char *src, </a:t>
+              <a:t>char* strncpy (char *dst, const char *src, </a:t>
             </a:r>
             <a:r>
               <a:rPr lang="en-US" smtClean="0">
@@ -6438,13 +6442,7 @@
               <a:rPr lang="fr-FR">
                 <a:latin typeface="Consolas" panose="020B0609020204030204" pitchFamily="49" charset="0"/>
               </a:rPr>
-              <a:t>const </a:t>
-            </a:r>
-            <a:r>
-              <a:rPr lang="fr-FR">
-                <a:latin typeface="Consolas" panose="020B0609020204030204" pitchFamily="49" charset="0"/>
-              </a:rPr>
-              <a:t>char </a:t>
+              <a:t>const char </a:t>
             </a:r>
             <a:r>
               <a:rPr lang="fr-FR" smtClean="0">
@@ -6500,13 +6498,7 @@
               <a:rPr lang="fr-FR">
                 <a:latin typeface="Consolas" panose="020B0609020204030204" pitchFamily="49" charset="0"/>
               </a:rPr>
-              <a:t>const char </a:t>
-            </a:r>
-            <a:r>
-              <a:rPr lang="fr-FR">
-                <a:latin typeface="Consolas" panose="020B0609020204030204" pitchFamily="49" charset="0"/>
-              </a:rPr>
-              <a:t>*</a:t>
+              <a:t>const char *</a:t>
             </a:r>
             <a:r>
               <a:rPr lang="fr-FR" smtClean="0">
@@ -6710,6 +6702,13 @@
   <p:clrMapOvr>
     <a:masterClrMapping/>
   </p:clrMapOvr>
+  <p:timing>
+    <p:tnLst>
+      <p:par>
+        <p:cTn id="1" dur="indefinite" restart="never" nodeType="tmRoot"/>
+      </p:par>
+    </p:tnLst>
+  </p:timing>
 </p:sld>
 </file>
 
@@ -6833,6 +6832,13 @@
   <p:clrMapOvr>
     <a:masterClrMapping/>
   </p:clrMapOvr>
+  <p:timing>
+    <p:tnLst>
+      <p:par>
+        <p:cTn id="1" dur="indefinite" restart="never" nodeType="tmRoot"/>
+      </p:par>
+    </p:tnLst>
+  </p:timing>
 </p:sld>
 </file>
 
@@ -6909,6 +6915,13 @@
   <p:clrMapOvr>
     <a:masterClrMapping/>
   </p:clrMapOvr>
+  <p:timing>
+    <p:tnLst>
+      <p:par>
+        <p:cTn id="1" dur="indefinite" restart="never" nodeType="tmRoot"/>
+      </p:par>
+    </p:tnLst>
+  </p:timing>
 </p:sld>
 </file>
 
@@ -7029,6 +7042,13 @@
   <p:clrMapOvr>
     <a:masterClrMapping/>
   </p:clrMapOvr>
+  <p:timing>
+    <p:tnLst>
+      <p:par>
+        <p:cTn id="1" dur="indefinite" restart="never" nodeType="tmRoot"/>
+      </p:par>
+    </p:tnLst>
+  </p:timing>
 </p:sld>
 </file>
 
@@ -8927,6 +8947,13 @@
   <p:clrMapOvr>
     <a:masterClrMapping/>
   </p:clrMapOvr>
+  <p:timing>
+    <p:tnLst>
+      <p:par>
+        <p:cTn id="1" dur="indefinite" restart="never" nodeType="tmRoot"/>
+      </p:par>
+    </p:tnLst>
+  </p:timing>
 </p:sld>
 </file>
 
@@ -9050,6 +9077,13 @@
   <p:clrMapOvr>
     <a:masterClrMapping/>
   </p:clrMapOvr>
+  <p:timing>
+    <p:tnLst>
+      <p:par>
+        <p:cTn id="1" dur="indefinite" restart="never" nodeType="tmRoot"/>
+      </p:par>
+    </p:tnLst>
+  </p:timing>
 </p:sld>
 </file>
 
@@ -9579,6 +9613,13 @@
   <p:clrMapOvr>
     <a:masterClrMapping/>
   </p:clrMapOvr>
+  <p:timing>
+    <p:tnLst>
+      <p:par>
+        <p:cTn id="1" dur="indefinite" restart="never" nodeType="tmRoot"/>
+      </p:par>
+    </p:tnLst>
+  </p:timing>
 </p:sld>
 </file>
 
@@ -11415,6 +11456,13 @@
   <p:clrMapOvr>
     <a:masterClrMapping/>
   </p:clrMapOvr>
+  <p:timing>
+    <p:tnLst>
+      <p:par>
+        <p:cTn id="1" dur="indefinite" restart="never" nodeType="tmRoot"/>
+      </p:par>
+    </p:tnLst>
+  </p:timing>
 </p:sld>
 </file>
 
@@ -13270,6 +13318,13 @@
   <p:clrMapOvr>
     <a:masterClrMapping/>
   </p:clrMapOvr>
+  <p:timing>
+    <p:tnLst>
+      <p:par>
+        <p:cTn id="1" dur="indefinite" restart="never" nodeType="tmRoot"/>
+      </p:par>
+    </p:tnLst>
+  </p:timing>
 </p:sld>
 </file>
 
@@ -13664,15 +13719,7 @@
                             <a:srgbClr val="FF0000"/>
                           </a:solidFill>
                         </a:rPr>
-                        <a:t>boost</a:t>
-                      </a:r>
-                      <a:r>
-                        <a:rPr lang="en-US" smtClean="0">
-                          <a:solidFill>
-                            <a:srgbClr val="FF0000"/>
-                          </a:solidFill>
-                        </a:rPr>
-                        <a:t>::tokenizer</a:t>
+                        <a:t>boost::tokenizer</a:t>
                       </a:r>
                       <a:endParaRPr lang="en-US">
                         <a:solidFill>
@@ -13942,6 +13989,13 @@
   <p:clrMapOvr>
     <a:masterClrMapping/>
   </p:clrMapOvr>
+  <p:timing>
+    <p:tnLst>
+      <p:par>
+        <p:cTn id="1" dur="indefinite" restart="never" nodeType="tmRoot"/>
+      </p:par>
+    </p:tnLst>
+  </p:timing>
 </p:sld>
 </file>
 
@@ -15020,6 +15074,13 @@
   <p:clrMapOvr>
     <a:masterClrMapping/>
   </p:clrMapOvr>
+  <p:timing>
+    <p:tnLst>
+      <p:par>
+        <p:cTn id="1" dur="indefinite" restart="never" nodeType="tmRoot"/>
+      </p:par>
+    </p:tnLst>
+  </p:timing>
 </p:sld>
 </file>
 
@@ -16589,6 +16650,13 @@
   <p:clrMapOvr>
     <a:masterClrMapping/>
   </p:clrMapOvr>
+  <p:timing>
+    <p:tnLst>
+      <p:par>
+        <p:cTn id="1" dur="indefinite" restart="never" nodeType="tmRoot"/>
+      </p:par>
+    </p:tnLst>
+  </p:timing>
 </p:sld>
 </file>
 
@@ -16864,6 +16932,13 @@
   <p:clrMapOvr>
     <a:masterClrMapping/>
   </p:clrMapOvr>
+  <p:timing>
+    <p:tnLst>
+      <p:par>
+        <p:cTn id="1" dur="indefinite" restart="never" nodeType="tmRoot"/>
+      </p:par>
+    </p:tnLst>
+  </p:timing>
 </p:sld>
 </file>
 
@@ -16940,6 +17015,13 @@
   <p:clrMapOvr>
     <a:masterClrMapping/>
   </p:clrMapOvr>
+  <p:timing>
+    <p:tnLst>
+      <p:par>
+        <p:cTn id="1" dur="indefinite" restart="never" nodeType="tmRoot"/>
+      </p:par>
+    </p:tnLst>
+  </p:timing>
 </p:sld>
 </file>
 
@@ -18037,6 +18119,13 @@
   <p:clrMapOvr>
     <a:masterClrMapping/>
   </p:clrMapOvr>
+  <p:timing>
+    <p:tnLst>
+      <p:par>
+        <p:cTn id="1" dur="indefinite" restart="never" nodeType="tmRoot"/>
+      </p:par>
+    </p:tnLst>
+  </p:timing>
 </p:sld>
 </file>
 
@@ -18178,6 +18267,13 @@
   <p:clrMapOvr>
     <a:masterClrMapping/>
   </p:clrMapOvr>
+  <p:timing>
+    <p:tnLst>
+      <p:par>
+        <p:cTn id="1" dur="indefinite" restart="never" nodeType="tmRoot"/>
+      </p:par>
+    </p:tnLst>
+  </p:timing>
 </p:sld>
 </file>
 
@@ -18278,6 +18374,13 @@
   <p:clrMapOvr>
     <a:masterClrMapping/>
   </p:clrMapOvr>
+  <p:timing>
+    <p:tnLst>
+      <p:par>
+        <p:cTn id="1" dur="indefinite" restart="never" nodeType="tmRoot"/>
+      </p:par>
+    </p:tnLst>
+  </p:timing>
 </p:sld>
 </file>
 
@@ -18437,6 +18540,13 @@
   <p:clrMapOvr>
     <a:masterClrMapping/>
   </p:clrMapOvr>
+  <p:timing>
+    <p:tnLst>
+      <p:par>
+        <p:cTn id="1" dur="indefinite" restart="never" nodeType="tmRoot"/>
+      </p:par>
+    </p:tnLst>
+  </p:timing>
 </p:sld>
 </file>
 
@@ -18579,6 +18689,13 @@
   <p:clrMapOvr>
     <a:masterClrMapping/>
   </p:clrMapOvr>
+  <p:timing>
+    <p:tnLst>
+      <p:par>
+        <p:cTn id="1" dur="indefinite" restart="never" nodeType="tmRoot"/>
+      </p:par>
+    </p:tnLst>
+  </p:timing>
 </p:sld>
 </file>
 
@@ -18729,6 +18846,13 @@
   <p:clrMapOvr>
     <a:masterClrMapping/>
   </p:clrMapOvr>
+  <p:timing>
+    <p:tnLst>
+      <p:par>
+        <p:cTn id="1" dur="indefinite" restart="never" nodeType="tmRoot"/>
+      </p:par>
+    </p:tnLst>
+  </p:timing>
 </p:sld>
 </file>
 
@@ -18909,6 +19033,13 @@
   <p:clrMapOvr>
     <a:masterClrMapping/>
   </p:clrMapOvr>
+  <p:timing>
+    <p:tnLst>
+      <p:par>
+        <p:cTn id="1" dur="indefinite" restart="never" nodeType="tmRoot"/>
+      </p:par>
+    </p:tnLst>
+  </p:timing>
 </p:sld>
 </file>
 
@@ -20502,6 +20633,13 @@
   <p:clrMapOvr>
     <a:masterClrMapping/>
   </p:clrMapOvr>
+  <p:timing>
+    <p:tnLst>
+      <p:par>
+        <p:cTn id="1" dur="indefinite" restart="never" nodeType="tmRoot"/>
+      </p:par>
+    </p:tnLst>
+  </p:timing>
 </p:sld>
 </file>
 
@@ -21010,6 +21148,13 @@
   <p:clrMapOvr>
     <a:masterClrMapping/>
   </p:clrMapOvr>
+  <p:timing>
+    <p:tnLst>
+      <p:par>
+        <p:cTn id="1" dur="indefinite" restart="never" nodeType="tmRoot"/>
+      </p:par>
+    </p:tnLst>
+  </p:timing>
 </p:sld>
 </file>
 
@@ -21087,7 +21232,7 @@
               <a:rPr lang="en-US" smtClean="0">
                 <a:latin typeface="Consolas" panose="020B0609020204030204" pitchFamily="49" charset="0"/>
               </a:rPr>
-              <a:t>std::string a = ssl ? "http" : "https";</a:t>
+              <a:t>std::string a = ssl ? "https" : "http";</a:t>
             </a:r>
           </a:p>
           <a:p>
@@ -21113,6 +21258,13 @@
   <p:clrMapOvr>
     <a:masterClrMapping/>
   </p:clrMapOvr>
+  <p:timing>
+    <p:tnLst>
+      <p:par>
+        <p:cTn id="1" dur="indefinite" restart="never" nodeType="tmRoot"/>
+      </p:par>
+    </p:tnLst>
+  </p:timing>
 </p:sld>
 </file>
 
@@ -21190,7 +21342,7 @@
               <a:rPr lang="en-US" smtClean="0">
                 <a:latin typeface="Consolas" panose="020B0609020204030204" pitchFamily="49" charset="0"/>
               </a:rPr>
-              <a:t>std::string a = ssl ? "http" : "https";</a:t>
+              <a:t>std::string a = ssl ? "https" : "http";</a:t>
             </a:r>
           </a:p>
           <a:p>
@@ -21256,13 +21408,25 @@
               <a:rPr lang="en-US">
                 <a:latin typeface="Consolas" panose="020B0609020204030204" pitchFamily="49" charset="0"/>
               </a:rPr>
-              <a:t>? "http" : "https</a:t>
-            </a:r>
-            <a:r>
-              <a:rPr lang="en-US" smtClean="0">
-                <a:latin typeface="Consolas" panose="020B0609020204030204" pitchFamily="49" charset="0"/>
-              </a:rPr>
-              <a:t>", </a:t>
+              <a:t>? "</a:t>
+            </a:r>
+            <a:r>
+              <a:rPr lang="en-US" smtClean="0">
+                <a:latin typeface="Consolas" panose="020B0609020204030204" pitchFamily="49" charset="0"/>
+              </a:rPr>
+              <a:t>https" </a:t>
+            </a:r>
+            <a:r>
+              <a:rPr lang="en-US">
+                <a:latin typeface="Consolas" panose="020B0609020204030204" pitchFamily="49" charset="0"/>
+              </a:rPr>
+              <a:t>: "</a:t>
+            </a:r>
+            <a:r>
+              <a:rPr lang="en-US" smtClean="0">
+                <a:latin typeface="Consolas" panose="020B0609020204030204" pitchFamily="49" charset="0"/>
+              </a:rPr>
+              <a:t>http", </a:t>
             </a:r>
             <a:br>
               <a:rPr lang="en-US" smtClean="0">
@@ -21306,6 +21470,13 @@
   <p:clrMapOvr>
     <a:masterClrMapping/>
   </p:clrMapOvr>
+  <p:timing>
+    <p:tnLst>
+      <p:par>
+        <p:cTn id="1" dur="indefinite" restart="never" nodeType="tmRoot"/>
+      </p:par>
+    </p:tnLst>
+  </p:timing>
 </p:sld>
 </file>
 
@@ -21363,7 +21534,12 @@
             <p:ph idx="1"/>
           </p:nvPr>
         </p:nvSpPr>
-        <p:spPr/>
+        <p:spPr>
+          <a:xfrm>
+            <a:off x="1143000" y="2057400"/>
+            <a:ext cx="10368643" cy="4038600"/>
+          </a:xfrm>
+        </p:spPr>
         <p:txBody>
           <a:bodyPr/>
           <a:lstStyle/>
@@ -21405,7 +21581,43 @@
               <a:rPr lang="en-US">
                 <a:latin typeface="Consolas" panose="020B0609020204030204" pitchFamily="49" charset="0"/>
               </a:rPr>
-              <a:t>ss &lt;&lt; ssl ? "http" : "https" &lt;&lt; "://" &lt;&lt; path &lt;&lt; "/" &lt;&lt; query;</a:t>
+              <a:t>ss &lt;&lt; </a:t>
+            </a:r>
+            <a:r>
+              <a:rPr lang="en-US" smtClean="0">
+                <a:latin typeface="Consolas" panose="020B0609020204030204" pitchFamily="49" charset="0"/>
+              </a:rPr>
+              <a:t>(ssl </a:t>
+            </a:r>
+            <a:r>
+              <a:rPr lang="en-US">
+                <a:latin typeface="Consolas" panose="020B0609020204030204" pitchFamily="49" charset="0"/>
+              </a:rPr>
+              <a:t>? "</a:t>
+            </a:r>
+            <a:r>
+              <a:rPr lang="en-US" smtClean="0">
+                <a:latin typeface="Consolas" panose="020B0609020204030204" pitchFamily="49" charset="0"/>
+              </a:rPr>
+              <a:t>https" </a:t>
+            </a:r>
+            <a:r>
+              <a:rPr lang="en-US">
+                <a:latin typeface="Consolas" panose="020B0609020204030204" pitchFamily="49" charset="0"/>
+              </a:rPr>
+              <a:t>: "</a:t>
+            </a:r>
+            <a:r>
+              <a:rPr lang="en-US" smtClean="0">
+                <a:latin typeface="Consolas" panose="020B0609020204030204" pitchFamily="49" charset="0"/>
+              </a:rPr>
+              <a:t>http") </a:t>
+            </a:r>
+            <a:r>
+              <a:rPr lang="en-US">
+                <a:latin typeface="Consolas" panose="020B0609020204030204" pitchFamily="49" charset="0"/>
+              </a:rPr>
+              <a:t>&lt;&lt; "://" &lt;&lt; path &lt;&lt; "/" &lt;&lt; query;</a:t>
             </a:r>
           </a:p>
           <a:p>
@@ -21459,6 +21671,13 @@
   <p:clrMapOvr>
     <a:masterClrMapping/>
   </p:clrMapOvr>
+  <p:timing>
+    <p:tnLst>
+      <p:par>
+        <p:cTn id="1" dur="indefinite" restart="never" nodeType="tmRoot"/>
+      </p:par>
+    </p:tnLst>
+  </p:timing>
 </p:sld>
 </file>
 
@@ -23109,6 +23328,13 @@
   <p:clrMapOvr>
     <a:masterClrMapping/>
   </p:clrMapOvr>
+  <p:timing>
+    <p:tnLst>
+      <p:par>
+        <p:cTn id="1" dur="indefinite" restart="never" nodeType="tmRoot"/>
+      </p:par>
+    </p:tnLst>
+  </p:timing>
 </p:sld>
 </file>
 
@@ -23331,6 +23557,13 @@
   <p:clrMapOvr>
     <a:masterClrMapping/>
   </p:clrMapOvr>
+  <p:timing>
+    <p:tnLst>
+      <p:par>
+        <p:cTn id="1" dur="indefinite" restart="never" nodeType="tmRoot"/>
+      </p:par>
+    </p:tnLst>
+  </p:timing>
 </p:sld>
 </file>
 
@@ -23454,6 +23687,13 @@
   <p:clrMapOvr>
     <a:masterClrMapping/>
   </p:clrMapOvr>
+  <p:timing>
+    <p:tnLst>
+      <p:par>
+        <p:cTn id="1" dur="indefinite" restart="never" nodeType="tmRoot"/>
+      </p:par>
+    </p:tnLst>
+  </p:timing>
 </p:sld>
 </file>
 
@@ -24744,6 +24984,13 @@
   <p:clrMapOvr>
     <a:masterClrMapping/>
   </p:clrMapOvr>
+  <p:timing>
+    <p:tnLst>
+      <p:par>
+        <p:cTn id="1" dur="indefinite" restart="never" nodeType="tmRoot"/>
+      </p:par>
+    </p:tnLst>
+  </p:timing>
 </p:sld>
 </file>
 
@@ -24781,11 +25028,7 @@
           <a:p>
             <a:r>
               <a:rPr lang="en-US" smtClean="0"/>
-              <a:t>GCC string (version &lt; 5</a:t>
-            </a:r>
-            <a:r>
-              <a:rPr lang="en-US" smtClean="0"/>
-              <a:t>), libstdc++</a:t>
+              <a:t>GCC string (version &lt; 5), libstdc++</a:t>
             </a:r>
             <a:endParaRPr lang="en-US"/>
           </a:p>
@@ -25877,6 +26120,13 @@
   <p:clrMapOvr>
     <a:masterClrMapping/>
   </p:clrMapOvr>
+  <p:timing>
+    <p:tnLst>
+      <p:par>
+        <p:cTn id="1" dur="indefinite" restart="never" nodeType="tmRoot"/>
+      </p:par>
+    </p:tnLst>
+  </p:timing>
 </p:sld>
 </file>
 
@@ -25963,6 +26213,13 @@
   <p:clrMapOvr>
     <a:masterClrMapping/>
   </p:clrMapOvr>
+  <p:timing>
+    <p:tnLst>
+      <p:par>
+        <p:cTn id="1" dur="indefinite" restart="never" nodeType="tmRoot"/>
+      </p:par>
+    </p:tnLst>
+  </p:timing>
 </p:sld>
 </file>
 
@@ -26142,6 +26399,13 @@
   <p:clrMapOvr>
     <a:masterClrMapping/>
   </p:clrMapOvr>
+  <p:timing>
+    <p:tnLst>
+      <p:par>
+        <p:cTn id="1" dur="indefinite" restart="never" nodeType="tmRoot"/>
+      </p:par>
+    </p:tnLst>
+  </p:timing>
 </p:sld>
 </file>
 
@@ -26297,6 +26561,13 @@
   <p:clrMapOvr>
     <a:masterClrMapping/>
   </p:clrMapOvr>
+  <p:timing>
+    <p:tnLst>
+      <p:par>
+        <p:cTn id="1" dur="indefinite" restart="never" nodeType="tmRoot"/>
+      </p:par>
+    </p:tnLst>
+  </p:timing>
 </p:sld>
 </file>
 
@@ -26513,6 +26784,13 @@
   <p:clrMapOvr>
     <a:masterClrMapping/>
   </p:clrMapOvr>
+  <p:timing>
+    <p:tnLst>
+      <p:par>
+        <p:cTn id="1" dur="indefinite" restart="never" nodeType="tmRoot"/>
+      </p:par>
+    </p:tnLst>
+  </p:timing>
 </p:sld>
 </file>
 
@@ -26757,6 +27035,13 @@
   <p:clrMapOvr>
     <a:masterClrMapping/>
   </p:clrMapOvr>
+  <p:timing>
+    <p:tnLst>
+      <p:par>
+        <p:cTn id="1" dur="indefinite" restart="never" nodeType="tmRoot"/>
+      </p:par>
+    </p:tnLst>
+  </p:timing>
 </p:sld>
 </file>
 
@@ -28308,6 +28593,13 @@
   <p:clrMapOvr>
     <a:masterClrMapping/>
   </p:clrMapOvr>
+  <p:timing>
+    <p:tnLst>
+      <p:par>
+        <p:cTn id="1" dur="indefinite" restart="never" nodeType="tmRoot"/>
+      </p:par>
+    </p:tnLst>
+  </p:timing>
 </p:sld>
 </file>
 
@@ -29492,6 +29784,13 @@
   <p:clrMapOvr>
     <a:masterClrMapping/>
   </p:clrMapOvr>
+  <p:timing>
+    <p:tnLst>
+      <p:par>
+        <p:cTn id="1" dur="indefinite" restart="never" nodeType="tmRoot"/>
+      </p:par>
+    </p:tnLst>
+  </p:timing>
 </p:sld>
 </file>
 
@@ -29947,6 +30246,13 @@
   <p:clrMapOvr>
     <a:masterClrMapping/>
   </p:clrMapOvr>
+  <p:timing>
+    <p:tnLst>
+      <p:par>
+        <p:cTn id="1" dur="indefinite" restart="never" nodeType="tmRoot"/>
+      </p:par>
+    </p:tnLst>
+  </p:timing>
 </p:sld>
 </file>
 
@@ -30081,6 +30387,13 @@
   <p:clrMapOvr>
     <a:masterClrMapping/>
   </p:clrMapOvr>
+  <p:timing>
+    <p:tnLst>
+      <p:par>
+        <p:cTn id="1" dur="indefinite" restart="never" nodeType="tmRoot"/>
+      </p:par>
+    </p:tnLst>
+  </p:timing>
 </p:sld>
 </file>
 
@@ -30703,6 +31016,13 @@
   <p:clrMapOvr>
     <a:masterClrMapping/>
   </p:clrMapOvr>
+  <p:timing>
+    <p:tnLst>
+      <p:par>
+        <p:cTn id="1" dur="indefinite" restart="never" nodeType="tmRoot"/>
+      </p:par>
+    </p:tnLst>
+  </p:timing>
 </p:sld>
 </file>
 
@@ -30829,6 +31149,13 @@
   <p:clrMapOvr>
     <a:masterClrMapping/>
   </p:clrMapOvr>
+  <p:timing>
+    <p:tnLst>
+      <p:par>
+        <p:cTn id="1" dur="indefinite" restart="never" nodeType="tmRoot"/>
+      </p:par>
+    </p:tnLst>
+  </p:timing>
 </p:sld>
 </file>
 
@@ -30952,6 +31279,13 @@
   <p:clrMapOvr>
     <a:masterClrMapping/>
   </p:clrMapOvr>
+  <p:timing>
+    <p:tnLst>
+      <p:par>
+        <p:cTn id="1" dur="indefinite" restart="never" nodeType="tmRoot"/>
+      </p:par>
+    </p:tnLst>
+  </p:timing>
 </p:sld>
 </file>
 
@@ -31237,6 +31571,13 @@
   <p:clrMapOvr>
     <a:masterClrMapping/>
   </p:clrMapOvr>
+  <p:timing>
+    <p:tnLst>
+      <p:par>
+        <p:cTn id="1" dur="indefinite" restart="never" nodeType="tmRoot"/>
+      </p:par>
+    </p:tnLst>
+  </p:timing>
 </p:sld>
 </file>
 
@@ -31415,6 +31756,13 @@
   <p:clrMapOvr>
     <a:masterClrMapping/>
   </p:clrMapOvr>
+  <p:timing>
+    <p:tnLst>
+      <p:par>
+        <p:cTn id="1" dur="indefinite" restart="never" nodeType="tmRoot"/>
+      </p:par>
+    </p:tnLst>
+  </p:timing>
 </p:sld>
 </file>
 
@@ -31677,6 +32025,13 @@
   <p:clrMapOvr>
     <a:masterClrMapping/>
   </p:clrMapOvr>
+  <p:timing>
+    <p:tnLst>
+      <p:par>
+        <p:cTn id="1" dur="indefinite" restart="never" nodeType="tmRoot"/>
+      </p:par>
+    </p:tnLst>
+  </p:timing>
 </p:sld>
 </file>
 
@@ -31753,6 +32108,13 @@
   <p:clrMapOvr>
     <a:masterClrMapping/>
   </p:clrMapOvr>
+  <p:timing>
+    <p:tnLst>
+      <p:par>
+        <p:cTn id="1" dur="indefinite" restart="never" nodeType="tmRoot"/>
+      </p:par>
+    </p:tnLst>
+  </p:timing>
 </p:sld>
 </file>
 
@@ -34063,6 +34425,13 @@
   <p:clrMapOvr>
     <a:masterClrMapping/>
   </p:clrMapOvr>
+  <p:timing>
+    <p:tnLst>
+      <p:par>
+        <p:cTn id="1" dur="indefinite" restart="never" nodeType="tmRoot"/>
+      </p:par>
+    </p:tnLst>
+  </p:timing>
 </p:sld>
 </file>
 
@@ -34147,6 +34516,13 @@
   <p:clrMapOvr>
     <a:masterClrMapping/>
   </p:clrMapOvr>
+  <p:timing>
+    <p:tnLst>
+      <p:par>
+        <p:cTn id="1" dur="indefinite" restart="never" nodeType="tmRoot"/>
+      </p:par>
+    </p:tnLst>
+  </p:timing>
 </p:sld>
 </file>
 
@@ -34232,13 +34608,7 @@
               <a:rPr lang="en-US">
                 <a:latin typeface="Consolas" panose="020B0609020204030204" pitchFamily="49" charset="0"/>
               </a:rPr>
-              <a:t>str = ";;Hello|world||-foo--</a:t>
-            </a:r>
-            <a:r>
-              <a:rPr lang="en-US">
-                <a:latin typeface="Consolas" panose="020B0609020204030204" pitchFamily="49" charset="0"/>
-              </a:rPr>
-              <a:t>bar;yow;baz</a:t>
+              <a:t>str = ";;Hello|world||-foo--bar;yow;baz</a:t>
             </a:r>
             <a:r>
               <a:rPr lang="en-US" smtClean="0">
@@ -34261,13 +34631,7 @@
               <a:rPr lang="en-US">
                 <a:latin typeface="Consolas" panose="020B0609020204030204" pitchFamily="49" charset="0"/>
               </a:rPr>
-              <a:t>&gt; </a:t>
-            </a:r>
-            <a:r>
-              <a:rPr lang="en-US">
-                <a:latin typeface="Consolas" panose="020B0609020204030204" pitchFamily="49" charset="0"/>
-              </a:rPr>
-              <a:t>sep</a:t>
+              <a:t>&gt; sep</a:t>
             </a:r>
             <a:r>
               <a:rPr lang="en-US" smtClean="0">
@@ -34302,13 +34666,7 @@
               <a:rPr lang="en-US">
                 <a:latin typeface="Consolas" panose="020B0609020204030204" pitchFamily="49" charset="0"/>
               </a:rPr>
-              <a:t> tokens(str, </a:t>
-            </a:r>
-            <a:r>
-              <a:rPr lang="en-US">
-                <a:latin typeface="Consolas" panose="020B0609020204030204" pitchFamily="49" charset="0"/>
-              </a:rPr>
-              <a:t>sep</a:t>
+              <a:t> tokens(str, sep</a:t>
             </a:r>
             <a:r>
               <a:rPr lang="en-US" smtClean="0">
@@ -34331,19 +34689,36 @@
               <a:rPr lang="en-US">
                 <a:latin typeface="Consolas" panose="020B0609020204030204" pitchFamily="49" charset="0"/>
               </a:rPr>
-              <a:t>(auto tok </a:t>
+              <a:t>(auto tok : </a:t>
+            </a:r>
+            <a:r>
+              <a:rPr lang="en-US" smtClean="0">
+                <a:latin typeface="Consolas" panose="020B0609020204030204" pitchFamily="49" charset="0"/>
+              </a:rPr>
+              <a:t>tokens)</a:t>
+            </a:r>
+            <a:br>
+              <a:rPr lang="en-US" smtClean="0">
+                <a:latin typeface="Consolas" panose="020B0609020204030204" pitchFamily="49" charset="0"/>
+              </a:rPr>
+            </a:br>
+            <a:r>
+              <a:rPr lang="en-US" smtClean="0">
+                <a:latin typeface="Consolas" panose="020B0609020204030204" pitchFamily="49" charset="0"/>
+              </a:rPr>
+              <a:t>  cout </a:t>
             </a:r>
             <a:r>
               <a:rPr lang="en-US">
                 <a:latin typeface="Consolas" panose="020B0609020204030204" pitchFamily="49" charset="0"/>
               </a:rPr>
-              <a:t>: </a:t>
-            </a:r>
-            <a:r>
-              <a:rPr lang="en-US" smtClean="0">
-                <a:latin typeface="Consolas" panose="020B0609020204030204" pitchFamily="49" charset="0"/>
-              </a:rPr>
-              <a:t>tokens)</a:t>
+              <a:t>&lt;&lt; "&lt;" &lt;&lt; tok &lt;&lt; "&gt; </a:t>
+            </a:r>
+            <a:r>
+              <a:rPr lang="en-US" smtClean="0">
+                <a:latin typeface="Consolas" panose="020B0609020204030204" pitchFamily="49" charset="0"/>
+              </a:rPr>
+              <a:t>";</a:t>
             </a:r>
             <a:br>
               <a:rPr lang="en-US" smtClean="0">
@@ -34354,48 +34729,13 @@
               <a:rPr lang="en-US" smtClean="0">
                 <a:latin typeface="Consolas" panose="020B0609020204030204" pitchFamily="49" charset="0"/>
               </a:rPr>
-              <a:t>  cout </a:t>
+              <a:t>cout </a:t>
             </a:r>
             <a:r>
               <a:rPr lang="en-US">
                 <a:latin typeface="Consolas" panose="020B0609020204030204" pitchFamily="49" charset="0"/>
               </a:rPr>
-              <a:t>&lt;&lt; "&lt;" &lt;&lt; tok &lt;&lt; </a:t>
-            </a:r>
-            <a:r>
-              <a:rPr lang="en-US">
-                <a:latin typeface="Consolas" panose="020B0609020204030204" pitchFamily="49" charset="0"/>
-              </a:rPr>
-              <a:t>"&gt; </a:t>
-            </a:r>
-            <a:r>
-              <a:rPr lang="en-US" smtClean="0">
-                <a:latin typeface="Consolas" panose="020B0609020204030204" pitchFamily="49" charset="0"/>
-              </a:rPr>
-              <a:t>";</a:t>
-            </a:r>
-            <a:br>
-              <a:rPr lang="en-US" smtClean="0">
-                <a:latin typeface="Consolas" panose="020B0609020204030204" pitchFamily="49" charset="0"/>
-              </a:rPr>
-            </a:br>
-            <a:r>
-              <a:rPr lang="en-US" smtClean="0">
-                <a:latin typeface="Consolas" panose="020B0609020204030204" pitchFamily="49" charset="0"/>
-              </a:rPr>
-              <a:t>cout </a:t>
-            </a:r>
-            <a:r>
-              <a:rPr lang="en-US">
-                <a:latin typeface="Consolas" panose="020B0609020204030204" pitchFamily="49" charset="0"/>
-              </a:rPr>
-              <a:t>&lt;&lt; </a:t>
-            </a:r>
-            <a:r>
-              <a:rPr lang="en-US">
-                <a:latin typeface="Consolas" panose="020B0609020204030204" pitchFamily="49" charset="0"/>
-              </a:rPr>
-              <a:t>endl</a:t>
+              <a:t>&lt;&lt; endl</a:t>
             </a:r>
             <a:r>
               <a:rPr lang="en-US" smtClean="0">
@@ -34423,6 +34763,13 @@
   <p:clrMapOvr>
     <a:masterClrMapping/>
   </p:clrMapOvr>
+  <p:timing>
+    <p:tnLst>
+      <p:par>
+        <p:cTn id="1" dur="indefinite" restart="never" nodeType="tmRoot"/>
+      </p:par>
+    </p:tnLst>
+  </p:timing>
 </p:sld>
 </file>
 
@@ -34565,6 +34912,13 @@
   <p:clrMapOvr>
     <a:masterClrMapping/>
   </p:clrMapOvr>
+  <p:timing>
+    <p:tnLst>
+      <p:par>
+        <p:cTn id="1" dur="indefinite" restart="never" nodeType="tmRoot"/>
+      </p:par>
+    </p:tnLst>
+  </p:timing>
 </p:sld>
 </file>
 
@@ -34795,6 +35149,13 @@
   <p:clrMapOvr>
     <a:masterClrMapping/>
   </p:clrMapOvr>
+  <p:timing>
+    <p:tnLst>
+      <p:par>
+        <p:cTn id="1" dur="indefinite" restart="never" nodeType="tmRoot"/>
+      </p:par>
+    </p:tnLst>
+  </p:timing>
 </p:sld>
 </file>
 
@@ -34883,6 +35244,13 @@
   <p:clrMapOvr>
     <a:masterClrMapping/>
   </p:clrMapOvr>
+  <p:timing>
+    <p:tnLst>
+      <p:par>
+        <p:cTn id="1" dur="indefinite" restart="never" nodeType="tmRoot"/>
+      </p:par>
+    </p:tnLst>
+  </p:timing>
 </p:sld>
 </file>
 
@@ -34950,8 +35318,12 @@
           <a:p>
             <a:pPr lvl="0"/>
             <a:r>
+              <a:rPr lang="en-US" smtClean="0"/>
+              <a:t>Bjarne Stroustrup, The </a:t>
+            </a:r>
+            <a:r>
               <a:rPr lang="en-US" dirty="0"/>
-              <a:t>The C++ Programming Language (4th </a:t>
+              <a:t>C++ Programming Language (4th </a:t>
             </a:r>
             <a:r>
               <a:rPr lang="en-US"/>
@@ -35044,6 +35416,13 @@
   <p:clrMapOvr>
     <a:masterClrMapping/>
   </p:clrMapOvr>
+  <p:timing>
+    <p:tnLst>
+      <p:par>
+        <p:cTn id="1" dur="indefinite" restart="never" nodeType="tmRoot"/>
+      </p:par>
+    </p:tnLst>
+  </p:timing>
 </p:sld>
 </file>
 

</xml_diff>